<commit_message>
add chat_error background and friends initial functionality
</commit_message>
<xml_diff>
--- a/Art/Chat/chat.pptx
+++ b/Art/Chat/chat.pptx
@@ -5096,10 +5096,10 @@
       </p:grpSpPr>
       <p:grpSp>
         <p:nvGrpSpPr>
-          <p:cNvPr id="2" name="Group 1">
+          <p:cNvPr id="8" name="Group 7">
             <a:extLst>
               <a:ext uri="{FF2B5EF4-FFF2-40B4-BE49-F238E27FC236}">
-                <a16:creationId xmlns:a16="http://schemas.microsoft.com/office/drawing/2014/main" id="{88CCB9F4-601A-6E41-ACD3-384749B69B75}"/>
+                <a16:creationId xmlns:a16="http://schemas.microsoft.com/office/drawing/2014/main" id="{CD58D481-598F-B747-B713-DA3F89B8B41A}"/>
               </a:ext>
             </a:extLst>
           </p:cNvPr>
@@ -5108,172 +5108,64 @@
         </p:nvGrpSpPr>
         <p:grpSpPr>
           <a:xfrm>
-            <a:off x="-1" y="0"/>
-            <a:ext cx="12206069" cy="6858000"/>
-            <a:chOff x="-1" y="0"/>
-            <a:chExt cx="12206069" cy="6858000"/>
+            <a:off x="0" y="0"/>
+            <a:ext cx="12206068" cy="6858000"/>
+            <a:chOff x="0" y="0"/>
+            <a:chExt cx="12206068" cy="6858000"/>
           </a:xfrm>
         </p:grpSpPr>
-        <p:grpSp>
-          <p:nvGrpSpPr>
-            <p:cNvPr id="8" name="Group 7">
+        <p:sp>
+          <p:nvSpPr>
+            <p:cNvPr id="4" name="Rectangle 3">
               <a:extLst>
                 <a:ext uri="{FF2B5EF4-FFF2-40B4-BE49-F238E27FC236}">
-                  <a16:creationId xmlns:a16="http://schemas.microsoft.com/office/drawing/2014/main" id="{CD58D481-598F-B747-B713-DA3F89B8B41A}"/>
+                  <a16:creationId xmlns:a16="http://schemas.microsoft.com/office/drawing/2014/main" id="{8EA49501-9188-FD43-8320-3C05E0FF554E}"/>
                 </a:ext>
               </a:extLst>
             </p:cNvPr>
-            <p:cNvGrpSpPr/>
+            <p:cNvSpPr/>
             <p:nvPr/>
-          </p:nvGrpSpPr>
-          <p:grpSpPr>
+          </p:nvSpPr>
+          <p:spPr>
             <a:xfrm>
               <a:off x="0" y="0"/>
-              <a:ext cx="12206068" cy="6858000"/>
-              <a:chOff x="0" y="0"/>
-              <a:chExt cx="12206068" cy="6858000"/>
+              <a:ext cx="12192000" cy="6858000"/>
             </a:xfrm>
-          </p:grpSpPr>
-          <p:sp>
-            <p:nvSpPr>
-              <p:cNvPr id="4" name="Rectangle 3">
-                <a:extLst>
-                  <a:ext uri="{FF2B5EF4-FFF2-40B4-BE49-F238E27FC236}">
-                    <a16:creationId xmlns:a16="http://schemas.microsoft.com/office/drawing/2014/main" id="{8EA49501-9188-FD43-8320-3C05E0FF554E}"/>
-                  </a:ext>
-                </a:extLst>
-              </p:cNvPr>
-              <p:cNvSpPr/>
-              <p:nvPr/>
-            </p:nvSpPr>
-            <p:spPr>
-              <a:xfrm>
-                <a:off x="0" y="0"/>
-                <a:ext cx="12192000" cy="6858000"/>
-              </a:xfrm>
-              <a:prstGeom prst="rect">
-                <a:avLst/>
-              </a:prstGeom>
-            </p:spPr>
-            <p:style>
-              <a:lnRef idx="2">
-                <a:schemeClr val="accent1">
-                  <a:shade val="50000"/>
-                </a:schemeClr>
-              </a:lnRef>
-              <a:fillRef idx="1">
-                <a:schemeClr val="accent1"/>
-              </a:fillRef>
-              <a:effectRef idx="0">
-                <a:schemeClr val="accent1"/>
-              </a:effectRef>
-              <a:fontRef idx="minor">
-                <a:schemeClr val="lt1"/>
-              </a:fontRef>
-            </p:style>
-            <p:txBody>
-              <a:bodyPr rtlCol="0" anchor="ctr"/>
-              <a:lstStyle/>
-              <a:p>
-                <a:pPr algn="ctr"/>
-                <a:endParaRPr lang="en-US"/>
-              </a:p>
-            </p:txBody>
-          </p:sp>
-          <p:sp>
-            <p:nvSpPr>
-              <p:cNvPr id="5" name="TextBox 4">
-                <a:extLst>
-                  <a:ext uri="{FF2B5EF4-FFF2-40B4-BE49-F238E27FC236}">
-                    <a16:creationId xmlns:a16="http://schemas.microsoft.com/office/drawing/2014/main" id="{53D3A3F7-3811-3941-94C8-614095526215}"/>
-                  </a:ext>
-                </a:extLst>
-              </p:cNvPr>
-              <p:cNvSpPr txBox="1"/>
-              <p:nvPr/>
-            </p:nvSpPr>
-            <p:spPr>
-              <a:xfrm>
-                <a:off x="14068" y="1128713"/>
-                <a:ext cx="12192000" cy="1754326"/>
-              </a:xfrm>
-              <a:prstGeom prst="rect">
-                <a:avLst/>
-              </a:prstGeom>
-              <a:noFill/>
-            </p:spPr>
-            <p:txBody>
-              <a:bodyPr wrap="square" rtlCol="0">
-                <a:spAutoFit/>
-              </a:bodyPr>
-              <a:lstStyle/>
-              <a:p>
-                <a:pPr algn="ctr"/>
-                <a:r>
-                  <a:rPr lang="en-US" sz="5400" dirty="0">
-                    <a:solidFill>
-                      <a:schemeClr val="bg2">
-                        <a:lumMod val="75000"/>
-                      </a:schemeClr>
-                    </a:solidFill>
-                    <a:latin typeface="Bahiana" pitchFamily="2" charset="77"/>
-                  </a:rPr>
-                  <a:t>Chat Server not online! </a:t>
-                </a:r>
-              </a:p>
-              <a:p>
-                <a:pPr algn="ctr"/>
-                <a:r>
-                  <a:rPr lang="en-US" sz="5400" dirty="0">
-                    <a:solidFill>
-                      <a:schemeClr val="bg2">
-                        <a:lumMod val="75000"/>
-                      </a:schemeClr>
-                    </a:solidFill>
-                    <a:latin typeface="Bahiana" pitchFamily="2" charset="77"/>
-                  </a:rPr>
-                  <a:t>See a customer representative for assistance :(</a:t>
-                </a:r>
-              </a:p>
-            </p:txBody>
-          </p:sp>
-          <p:pic>
-            <p:nvPicPr>
-              <p:cNvPr id="7" name="Picture 6">
-                <a:extLst>
-                  <a:ext uri="{FF2B5EF4-FFF2-40B4-BE49-F238E27FC236}">
-                    <a16:creationId xmlns:a16="http://schemas.microsoft.com/office/drawing/2014/main" id="{CC41838B-5583-284C-A054-CAB2ACE89538}"/>
-                  </a:ext>
-                </a:extLst>
-              </p:cNvPr>
-              <p:cNvPicPr>
-                <a:picLocks noChangeAspect="1"/>
-              </p:cNvPicPr>
-              <p:nvPr/>
-            </p:nvPicPr>
-            <p:blipFill>
-              <a:blip r:embed="rId2"/>
-              <a:stretch>
-                <a:fillRect/>
-              </a:stretch>
-            </p:blipFill>
-            <p:spPr>
-              <a:xfrm>
-                <a:off x="4538133" y="3429000"/>
-                <a:ext cx="3115733" cy="1971675"/>
-              </a:xfrm>
-              <a:prstGeom prst="rect">
-                <a:avLst/>
-              </a:prstGeom>
-            </p:spPr>
-          </p:pic>
-        </p:grpSp>
+            <a:prstGeom prst="rect">
+              <a:avLst/>
+            </a:prstGeom>
+          </p:spPr>
+          <p:style>
+            <a:lnRef idx="2">
+              <a:schemeClr val="accent1">
+                <a:shade val="50000"/>
+              </a:schemeClr>
+            </a:lnRef>
+            <a:fillRef idx="1">
+              <a:schemeClr val="accent1"/>
+            </a:fillRef>
+            <a:effectRef idx="0">
+              <a:schemeClr val="accent1"/>
+            </a:effectRef>
+            <a:fontRef idx="minor">
+              <a:schemeClr val="lt1"/>
+            </a:fontRef>
+          </p:style>
+          <p:txBody>
+            <a:bodyPr rtlCol="0" anchor="ctr"/>
+            <a:lstStyle/>
+            <a:p>
+              <a:pPr algn="ctr"/>
+              <a:endParaRPr lang="en-US"/>
+            </a:p>
+          </p:txBody>
+        </p:sp>
         <p:sp>
           <p:nvSpPr>
-            <p:cNvPr id="6" name="TextBox 5">
+            <p:cNvPr id="5" name="TextBox 4">
               <a:extLst>
                 <a:ext uri="{FF2B5EF4-FFF2-40B4-BE49-F238E27FC236}">
-                  <a16:creationId xmlns:a16="http://schemas.microsoft.com/office/drawing/2014/main" id="{2AAC7AEB-1C8E-664E-88FE-129D7E336087}"/>
+                  <a16:creationId xmlns:a16="http://schemas.microsoft.com/office/drawing/2014/main" id="{53D3A3F7-3811-3941-94C8-614095526215}"/>
                 </a:ext>
               </a:extLst>
             </p:cNvPr>
@@ -5282,8 +5174,8 @@
           </p:nvSpPr>
           <p:spPr>
             <a:xfrm>
-              <a:off x="-1" y="5744617"/>
-              <a:ext cx="12192000" cy="769441"/>
+              <a:off x="14068" y="1128713"/>
+              <a:ext cx="12192000" cy="1754326"/>
             </a:xfrm>
             <a:prstGeom prst="rect">
               <a:avLst/>
@@ -5298,7 +5190,7 @@
             <a:p>
               <a:pPr algn="ctr"/>
               <a:r>
-                <a:rPr lang="en-US" sz="4400" dirty="0">
+                <a:rPr lang="en-US" sz="5400" dirty="0">
                   <a:solidFill>
                     <a:schemeClr val="bg2">
                       <a:lumMod val="75000"/>
@@ -5306,11 +5198,55 @@
                   </a:solidFill>
                   <a:latin typeface="Bahiana" pitchFamily="2" charset="77"/>
                 </a:rPr>
-                <a:t>Press ‘ctrl-E’ to exit</a:t>
+                <a:t>Chat Server not online! </a:t>
+              </a:r>
+            </a:p>
+            <a:p>
+              <a:pPr algn="ctr"/>
+              <a:r>
+                <a:rPr lang="en-US" sz="5400" dirty="0">
+                  <a:solidFill>
+                    <a:schemeClr val="bg2">
+                      <a:lumMod val="75000"/>
+                    </a:schemeClr>
+                  </a:solidFill>
+                  <a:latin typeface="Bahiana" pitchFamily="2" charset="77"/>
+                </a:rPr>
+                <a:t>See a customer representative for assistance :(</a:t>
               </a:r>
             </a:p>
           </p:txBody>
         </p:sp>
+        <p:pic>
+          <p:nvPicPr>
+            <p:cNvPr id="7" name="Picture 6">
+              <a:extLst>
+                <a:ext uri="{FF2B5EF4-FFF2-40B4-BE49-F238E27FC236}">
+                  <a16:creationId xmlns:a16="http://schemas.microsoft.com/office/drawing/2014/main" id="{CC41838B-5583-284C-A054-CAB2ACE89538}"/>
+                </a:ext>
+              </a:extLst>
+            </p:cNvPr>
+            <p:cNvPicPr>
+              <a:picLocks noChangeAspect="1"/>
+            </p:cNvPicPr>
+            <p:nvPr/>
+          </p:nvPicPr>
+          <p:blipFill>
+            <a:blip r:embed="rId2"/>
+            <a:stretch>
+              <a:fillRect/>
+            </a:stretch>
+          </p:blipFill>
+          <p:spPr>
+            <a:xfrm>
+              <a:off x="4538133" y="3429000"/>
+              <a:ext cx="3115733" cy="1971675"/>
+            </a:xfrm>
+            <a:prstGeom prst="rect">
+              <a:avLst/>
+            </a:prstGeom>
+          </p:spPr>
+        </p:pic>
       </p:grpSp>
     </p:spTree>
     <p:extLst>

</xml_diff>